<commit_message>
Added fraud detection presentation
</commit_message>
<xml_diff>
--- a/FRAUD DETECTION USING TRANSACTION DATASET.pptx
+++ b/FRAUD DETECTION USING TRANSACTION DATASET.pptx
@@ -118,6 +118,11 @@
       </a:defRPr>
     </a:lvl9pPr>
   </p:defaultTextStyle>
+  <p:extLst>
+    <p:ext uri="{EFAFB233-063F-42B5-8137-9DF3F51BA10A}">
+      <p15:sldGuideLst xmlns:p15="http://schemas.microsoft.com/office/powerpoint/2012/main"/>
+    </p:ext>
+  </p:extLst>
 </p:presentation>
 </file>
 
@@ -270,7 +275,7 @@
           <a:p>
             <a:fld id="{FDCCA50A-92D7-4F78-93A9-37C09CA97B09}" type="datetimeFigureOut">
               <a:rPr lang="en-IN" smtClean="0"/>
-              <a:t>19-07-2025</a:t>
+              <a:t>20-07-2025</a:t>
             </a:fld>
             <a:endParaRPr lang="en-IN"/>
           </a:p>
@@ -340,6 +345,18 @@
   <p:clrMapOvr>
     <a:masterClrMapping/>
   </p:clrMapOvr>
+  <mc:AlternateContent xmlns:mc="http://schemas.openxmlformats.org/markup-compatibility/2006">
+    <mc:Choice xmlns:p14="http://schemas.microsoft.com/office/powerpoint/2010/main" Requires="p14">
+      <p:transition spd="slow" p14:dur="800">
+        <p:circle/>
+      </p:transition>
+    </mc:Choice>
+    <mc:Fallback>
+      <p:transition spd="slow">
+        <p:circle/>
+      </p:transition>
+    </mc:Fallback>
+  </mc:AlternateContent>
 </p:sldLayout>
 </file>
 
@@ -470,7 +487,7 @@
           <a:p>
             <a:fld id="{FDCCA50A-92D7-4F78-93A9-37C09CA97B09}" type="datetimeFigureOut">
               <a:rPr lang="en-IN" smtClean="0"/>
-              <a:t>19-07-2025</a:t>
+              <a:t>20-07-2025</a:t>
             </a:fld>
             <a:endParaRPr lang="en-IN"/>
           </a:p>
@@ -540,6 +557,18 @@
   <p:clrMapOvr>
     <a:masterClrMapping/>
   </p:clrMapOvr>
+  <mc:AlternateContent xmlns:mc="http://schemas.openxmlformats.org/markup-compatibility/2006">
+    <mc:Choice xmlns:p14="http://schemas.microsoft.com/office/powerpoint/2010/main" Requires="p14">
+      <p:transition spd="slow" p14:dur="800">
+        <p:circle/>
+      </p:transition>
+    </mc:Choice>
+    <mc:Fallback>
+      <p:transition spd="slow">
+        <p:circle/>
+      </p:transition>
+    </mc:Fallback>
+  </mc:AlternateContent>
 </p:sldLayout>
 </file>
 
@@ -680,7 +709,7 @@
           <a:p>
             <a:fld id="{FDCCA50A-92D7-4F78-93A9-37C09CA97B09}" type="datetimeFigureOut">
               <a:rPr lang="en-IN" smtClean="0"/>
-              <a:t>19-07-2025</a:t>
+              <a:t>20-07-2025</a:t>
             </a:fld>
             <a:endParaRPr lang="en-IN"/>
           </a:p>
@@ -750,6 +779,18 @@
   <p:clrMapOvr>
     <a:masterClrMapping/>
   </p:clrMapOvr>
+  <mc:AlternateContent xmlns:mc="http://schemas.openxmlformats.org/markup-compatibility/2006">
+    <mc:Choice xmlns:p14="http://schemas.microsoft.com/office/powerpoint/2010/main" Requires="p14">
+      <p:transition spd="slow" p14:dur="800">
+        <p:circle/>
+      </p:transition>
+    </mc:Choice>
+    <mc:Fallback>
+      <p:transition spd="slow">
+        <p:circle/>
+      </p:transition>
+    </mc:Fallback>
+  </mc:AlternateContent>
 </p:sldLayout>
 </file>
 
@@ -880,7 +921,7 @@
           <a:p>
             <a:fld id="{FDCCA50A-92D7-4F78-93A9-37C09CA97B09}" type="datetimeFigureOut">
               <a:rPr lang="en-IN" smtClean="0"/>
-              <a:t>19-07-2025</a:t>
+              <a:t>20-07-2025</a:t>
             </a:fld>
             <a:endParaRPr lang="en-IN"/>
           </a:p>
@@ -950,6 +991,18 @@
   <p:clrMapOvr>
     <a:masterClrMapping/>
   </p:clrMapOvr>
+  <mc:AlternateContent xmlns:mc="http://schemas.openxmlformats.org/markup-compatibility/2006">
+    <mc:Choice xmlns:p14="http://schemas.microsoft.com/office/powerpoint/2010/main" Requires="p14">
+      <p:transition spd="slow" p14:dur="800">
+        <p:circle/>
+      </p:transition>
+    </mc:Choice>
+    <mc:Fallback>
+      <p:transition spd="slow">
+        <p:circle/>
+      </p:transition>
+    </mc:Fallback>
+  </mc:AlternateContent>
 </p:sldLayout>
 </file>
 
@@ -1156,7 +1209,7 @@
           <a:p>
             <a:fld id="{FDCCA50A-92D7-4F78-93A9-37C09CA97B09}" type="datetimeFigureOut">
               <a:rPr lang="en-IN" smtClean="0"/>
-              <a:t>19-07-2025</a:t>
+              <a:t>20-07-2025</a:t>
             </a:fld>
             <a:endParaRPr lang="en-IN"/>
           </a:p>
@@ -1226,6 +1279,18 @@
   <p:clrMapOvr>
     <a:masterClrMapping/>
   </p:clrMapOvr>
+  <mc:AlternateContent xmlns:mc="http://schemas.openxmlformats.org/markup-compatibility/2006">
+    <mc:Choice xmlns:p14="http://schemas.microsoft.com/office/powerpoint/2010/main" Requires="p14">
+      <p:transition spd="slow" p14:dur="800">
+        <p:circle/>
+      </p:transition>
+    </mc:Choice>
+    <mc:Fallback>
+      <p:transition spd="slow">
+        <p:circle/>
+      </p:transition>
+    </mc:Fallback>
+  </mc:AlternateContent>
 </p:sldLayout>
 </file>
 
@@ -1424,7 +1489,7 @@
           <a:p>
             <a:fld id="{FDCCA50A-92D7-4F78-93A9-37C09CA97B09}" type="datetimeFigureOut">
               <a:rPr lang="en-IN" smtClean="0"/>
-              <a:t>19-07-2025</a:t>
+              <a:t>20-07-2025</a:t>
             </a:fld>
             <a:endParaRPr lang="en-IN"/>
           </a:p>
@@ -1494,6 +1559,18 @@
   <p:clrMapOvr>
     <a:masterClrMapping/>
   </p:clrMapOvr>
+  <mc:AlternateContent xmlns:mc="http://schemas.openxmlformats.org/markup-compatibility/2006">
+    <mc:Choice xmlns:p14="http://schemas.microsoft.com/office/powerpoint/2010/main" Requires="p14">
+      <p:transition spd="slow" p14:dur="800">
+        <p:circle/>
+      </p:transition>
+    </mc:Choice>
+    <mc:Fallback>
+      <p:transition spd="slow">
+        <p:circle/>
+      </p:transition>
+    </mc:Fallback>
+  </mc:AlternateContent>
 </p:sldLayout>
 </file>
 
@@ -1839,7 +1916,7 @@
           <a:p>
             <a:fld id="{FDCCA50A-92D7-4F78-93A9-37C09CA97B09}" type="datetimeFigureOut">
               <a:rPr lang="en-IN" smtClean="0"/>
-              <a:t>19-07-2025</a:t>
+              <a:t>20-07-2025</a:t>
             </a:fld>
             <a:endParaRPr lang="en-IN"/>
           </a:p>
@@ -1909,6 +1986,18 @@
   <p:clrMapOvr>
     <a:masterClrMapping/>
   </p:clrMapOvr>
+  <mc:AlternateContent xmlns:mc="http://schemas.openxmlformats.org/markup-compatibility/2006">
+    <mc:Choice xmlns:p14="http://schemas.microsoft.com/office/powerpoint/2010/main" Requires="p14">
+      <p:transition spd="slow" p14:dur="800">
+        <p:circle/>
+      </p:transition>
+    </mc:Choice>
+    <mc:Fallback>
+      <p:transition spd="slow">
+        <p:circle/>
+      </p:transition>
+    </mc:Fallback>
+  </mc:AlternateContent>
 </p:sldLayout>
 </file>
 
@@ -1981,7 +2070,7 @@
           <a:p>
             <a:fld id="{FDCCA50A-92D7-4F78-93A9-37C09CA97B09}" type="datetimeFigureOut">
               <a:rPr lang="en-IN" smtClean="0"/>
-              <a:t>19-07-2025</a:t>
+              <a:t>20-07-2025</a:t>
             </a:fld>
             <a:endParaRPr lang="en-IN"/>
           </a:p>
@@ -2051,6 +2140,18 @@
   <p:clrMapOvr>
     <a:masterClrMapping/>
   </p:clrMapOvr>
+  <mc:AlternateContent xmlns:mc="http://schemas.openxmlformats.org/markup-compatibility/2006">
+    <mc:Choice xmlns:p14="http://schemas.microsoft.com/office/powerpoint/2010/main" Requires="p14">
+      <p:transition spd="slow" p14:dur="800">
+        <p:circle/>
+      </p:transition>
+    </mc:Choice>
+    <mc:Fallback>
+      <p:transition spd="slow">
+        <p:circle/>
+      </p:transition>
+    </mc:Fallback>
+  </mc:AlternateContent>
 </p:sldLayout>
 </file>
 
@@ -2094,7 +2195,7 @@
           <a:p>
             <a:fld id="{FDCCA50A-92D7-4F78-93A9-37C09CA97B09}" type="datetimeFigureOut">
               <a:rPr lang="en-IN" smtClean="0"/>
-              <a:t>19-07-2025</a:t>
+              <a:t>20-07-2025</a:t>
             </a:fld>
             <a:endParaRPr lang="en-IN"/>
           </a:p>
@@ -2164,6 +2265,18 @@
   <p:clrMapOvr>
     <a:masterClrMapping/>
   </p:clrMapOvr>
+  <mc:AlternateContent xmlns:mc="http://schemas.openxmlformats.org/markup-compatibility/2006">
+    <mc:Choice xmlns:p14="http://schemas.microsoft.com/office/powerpoint/2010/main" Requires="p14">
+      <p:transition spd="slow" p14:dur="800">
+        <p:circle/>
+      </p:transition>
+    </mc:Choice>
+    <mc:Fallback>
+      <p:transition spd="slow">
+        <p:circle/>
+      </p:transition>
+    </mc:Fallback>
+  </mc:AlternateContent>
 </p:sldLayout>
 </file>
 
@@ -2407,7 +2520,7 @@
           <a:p>
             <a:fld id="{FDCCA50A-92D7-4F78-93A9-37C09CA97B09}" type="datetimeFigureOut">
               <a:rPr lang="en-IN" smtClean="0"/>
-              <a:t>19-07-2025</a:t>
+              <a:t>20-07-2025</a:t>
             </a:fld>
             <a:endParaRPr lang="en-IN"/>
           </a:p>
@@ -2477,6 +2590,18 @@
   <p:clrMapOvr>
     <a:masterClrMapping/>
   </p:clrMapOvr>
+  <mc:AlternateContent xmlns:mc="http://schemas.openxmlformats.org/markup-compatibility/2006">
+    <mc:Choice xmlns:p14="http://schemas.microsoft.com/office/powerpoint/2010/main" Requires="p14">
+      <p:transition spd="slow" p14:dur="800">
+        <p:circle/>
+      </p:transition>
+    </mc:Choice>
+    <mc:Fallback>
+      <p:transition spd="slow">
+        <p:circle/>
+      </p:transition>
+    </mc:Fallback>
+  </mc:AlternateContent>
 </p:sldLayout>
 </file>
 
@@ -2696,7 +2821,7 @@
           <a:p>
             <a:fld id="{FDCCA50A-92D7-4F78-93A9-37C09CA97B09}" type="datetimeFigureOut">
               <a:rPr lang="en-IN" smtClean="0"/>
-              <a:t>19-07-2025</a:t>
+              <a:t>20-07-2025</a:t>
             </a:fld>
             <a:endParaRPr lang="en-IN"/>
           </a:p>
@@ -2766,6 +2891,18 @@
   <p:clrMapOvr>
     <a:masterClrMapping/>
   </p:clrMapOvr>
+  <mc:AlternateContent xmlns:mc="http://schemas.openxmlformats.org/markup-compatibility/2006">
+    <mc:Choice xmlns:p14="http://schemas.microsoft.com/office/powerpoint/2010/main" Requires="p14">
+      <p:transition spd="slow" p14:dur="800">
+        <p:circle/>
+      </p:transition>
+    </mc:Choice>
+    <mc:Fallback>
+      <p:transition spd="slow">
+        <p:circle/>
+      </p:transition>
+    </mc:Fallback>
+  </mc:AlternateContent>
 </p:sldLayout>
 </file>
 
@@ -2939,7 +3076,7 @@
           <a:p>
             <a:fld id="{FDCCA50A-92D7-4F78-93A9-37C09CA97B09}" type="datetimeFigureOut">
               <a:rPr lang="en-IN" smtClean="0"/>
-              <a:t>19-07-2025</a:t>
+              <a:t>20-07-2025</a:t>
             </a:fld>
             <a:endParaRPr lang="en-IN"/>
           </a:p>
@@ -3056,6 +3193,18 @@
     <p:sldLayoutId id="2147483658" r:id="rId10"/>
     <p:sldLayoutId id="2147483659" r:id="rId11"/>
   </p:sldLayoutIdLst>
+  <mc:AlternateContent xmlns:mc="http://schemas.openxmlformats.org/markup-compatibility/2006">
+    <mc:Choice xmlns:p14="http://schemas.microsoft.com/office/powerpoint/2010/main" Requires="p14">
+      <p:transition spd="slow" p14:dur="800">
+        <p:circle/>
+      </p:transition>
+    </mc:Choice>
+    <mc:Fallback>
+      <p:transition spd="slow">
+        <p:circle/>
+      </p:transition>
+    </mc:Fallback>
+  </mc:AlternateContent>
   <p:txStyles>
     <p:titleStyle>
       <a:lvl1pPr algn="l" defTabSz="914400" rtl="0" eaLnBrk="1" latinLnBrk="0" hangingPunct="1">
@@ -3378,10 +3527,10 @@
           <a:lstStyle/>
           <a:p>
             <a:r>
-              <a:rPr lang="en-US"/>
+              <a:rPr lang="en-US" b="1"/>
               <a:t>FRAUD DETECTION USING TRANSACTION DATASET</a:t>
             </a:r>
-            <a:endParaRPr lang="en-IN"/>
+            <a:endParaRPr lang="en-IN" b="1"/>
           </a:p>
         </p:txBody>
       </p:sp>
@@ -3424,6 +3573,18 @@
   <p:clrMapOvr>
     <a:masterClrMapping/>
   </p:clrMapOvr>
+  <mc:AlternateContent xmlns:mc="http://schemas.openxmlformats.org/markup-compatibility/2006">
+    <mc:Choice xmlns:p14="http://schemas.microsoft.com/office/powerpoint/2010/main" Requires="p14">
+      <p:transition spd="slow" p14:dur="800">
+        <p:circle/>
+      </p:transition>
+    </mc:Choice>
+    <mc:Fallback>
+      <p:transition spd="slow">
+        <p:circle/>
+      </p:transition>
+    </mc:Fallback>
+  </mc:AlternateContent>
 </p:sld>
 </file>
 
@@ -3565,6 +3726,18 @@
   <p:clrMapOvr>
     <a:masterClrMapping/>
   </p:clrMapOvr>
+  <mc:AlternateContent xmlns:mc="http://schemas.openxmlformats.org/markup-compatibility/2006">
+    <mc:Choice xmlns:p14="http://schemas.microsoft.com/office/powerpoint/2010/main" Requires="p14">
+      <p:transition spd="slow" p14:dur="800">
+        <p:circle/>
+      </p:transition>
+    </mc:Choice>
+    <mc:Fallback>
+      <p:transition spd="slow">
+        <p:circle/>
+      </p:transition>
+    </mc:Fallback>
+  </mc:AlternateContent>
 </p:sld>
 </file>
 
@@ -3750,6 +3923,18 @@
   <p:clrMapOvr>
     <a:masterClrMapping/>
   </p:clrMapOvr>
+  <mc:AlternateContent xmlns:mc="http://schemas.openxmlformats.org/markup-compatibility/2006">
+    <mc:Choice xmlns:p14="http://schemas.microsoft.com/office/powerpoint/2010/main" Requires="p14">
+      <p:transition spd="slow" p14:dur="800">
+        <p:circle/>
+      </p:transition>
+    </mc:Choice>
+    <mc:Fallback>
+      <p:transition spd="slow">
+        <p:circle/>
+      </p:transition>
+    </mc:Fallback>
+  </mc:AlternateContent>
 </p:sld>
 </file>
 
@@ -3982,6 +4167,18 @@
   <p:clrMapOvr>
     <a:masterClrMapping/>
   </p:clrMapOvr>
+  <mc:AlternateContent xmlns:mc="http://schemas.openxmlformats.org/markup-compatibility/2006">
+    <mc:Choice xmlns:p14="http://schemas.microsoft.com/office/powerpoint/2010/main" Requires="p14">
+      <p:transition spd="slow" p14:dur="800">
+        <p:circle/>
+      </p:transition>
+    </mc:Choice>
+    <mc:Fallback>
+      <p:transition spd="slow">
+        <p:circle/>
+      </p:transition>
+    </mc:Fallback>
+  </mc:AlternateContent>
 </p:sld>
 </file>
 
@@ -4279,6 +4476,18 @@
   <p:clrMapOvr>
     <a:masterClrMapping/>
   </p:clrMapOvr>
+  <mc:AlternateContent xmlns:mc="http://schemas.openxmlformats.org/markup-compatibility/2006">
+    <mc:Choice xmlns:p14="http://schemas.microsoft.com/office/powerpoint/2010/main" Requires="p14">
+      <p:transition spd="slow" p14:dur="800">
+        <p:circle/>
+      </p:transition>
+    </mc:Choice>
+    <mc:Fallback>
+      <p:transition spd="slow">
+        <p:circle/>
+      </p:transition>
+    </mc:Fallback>
+  </mc:AlternateContent>
 </p:sld>
 </file>
 
@@ -4423,6 +4632,18 @@
   <p:clrMapOvr>
     <a:masterClrMapping/>
   </p:clrMapOvr>
+  <mc:AlternateContent xmlns:mc="http://schemas.openxmlformats.org/markup-compatibility/2006">
+    <mc:Choice xmlns:p14="http://schemas.microsoft.com/office/powerpoint/2010/main" Requires="p14">
+      <p:transition spd="slow" p14:dur="800">
+        <p:circle/>
+      </p:transition>
+    </mc:Choice>
+    <mc:Fallback>
+      <p:transition spd="slow">
+        <p:circle/>
+      </p:transition>
+    </mc:Fallback>
+  </mc:AlternateContent>
 </p:sld>
 </file>
 
@@ -4531,6 +4752,18 @@
   <p:clrMapOvr>
     <a:masterClrMapping/>
   </p:clrMapOvr>
+  <mc:AlternateContent xmlns:mc="http://schemas.openxmlformats.org/markup-compatibility/2006">
+    <mc:Choice xmlns:p14="http://schemas.microsoft.com/office/powerpoint/2010/main" Requires="p14">
+      <p:transition spd="slow" p14:dur="800">
+        <p:circle/>
+      </p:transition>
+    </mc:Choice>
+    <mc:Fallback>
+      <p:transition spd="slow">
+        <p:circle/>
+      </p:transition>
+    </mc:Fallback>
+  </mc:AlternateContent>
 </p:sld>
 </file>
 
@@ -4665,6 +4898,18 @@
   <p:clrMapOvr>
     <a:masterClrMapping/>
   </p:clrMapOvr>
+  <mc:AlternateContent xmlns:mc="http://schemas.openxmlformats.org/markup-compatibility/2006">
+    <mc:Choice xmlns:p14="http://schemas.microsoft.com/office/powerpoint/2010/main" Requires="p14">
+      <p:transition spd="slow" p14:dur="800">
+        <p:circle/>
+      </p:transition>
+    </mc:Choice>
+    <mc:Fallback>
+      <p:transition spd="slow">
+        <p:circle/>
+      </p:transition>
+    </mc:Fallback>
+  </mc:AlternateContent>
 </p:sld>
 </file>
 
@@ -4806,6 +5051,18 @@
   <p:clrMapOvr>
     <a:masterClrMapping/>
   </p:clrMapOvr>
+  <mc:AlternateContent xmlns:mc="http://schemas.openxmlformats.org/markup-compatibility/2006">
+    <mc:Choice xmlns:p14="http://schemas.microsoft.com/office/powerpoint/2010/main" Requires="p14">
+      <p:transition spd="slow" p14:dur="800">
+        <p:circle/>
+      </p:transition>
+    </mc:Choice>
+    <mc:Fallback>
+      <p:transition spd="slow">
+        <p:circle/>
+      </p:transition>
+    </mc:Fallback>
+  </mc:AlternateContent>
 </p:sld>
 </file>
 
@@ -4914,6 +5171,18 @@
   <p:clrMapOvr>
     <a:masterClrMapping/>
   </p:clrMapOvr>
+  <mc:AlternateContent xmlns:mc="http://schemas.openxmlformats.org/markup-compatibility/2006">
+    <mc:Choice xmlns:p14="http://schemas.microsoft.com/office/powerpoint/2010/main" Requires="p14">
+      <p:transition spd="slow" p14:dur="800">
+        <p:circle/>
+      </p:transition>
+    </mc:Choice>
+    <mc:Fallback>
+      <p:transition spd="slow">
+        <p:circle/>
+      </p:transition>
+    </mc:Fallback>
+  </mc:AlternateContent>
 </p:sld>
 </file>
 
@@ -5046,6 +5315,18 @@
   <p:clrMapOvr>
     <a:masterClrMapping/>
   </p:clrMapOvr>
+  <mc:AlternateContent xmlns:mc="http://schemas.openxmlformats.org/markup-compatibility/2006">
+    <mc:Choice xmlns:p14="http://schemas.microsoft.com/office/powerpoint/2010/main" Requires="p14">
+      <p:transition spd="slow" p14:dur="800">
+        <p:circle/>
+      </p:transition>
+    </mc:Choice>
+    <mc:Fallback>
+      <p:transition spd="slow">
+        <p:circle/>
+      </p:transition>
+    </mc:Fallback>
+  </mc:AlternateContent>
 </p:sld>
 </file>
 
@@ -5613,6 +5894,18 @@
   <p:clrMapOvr>
     <a:masterClrMapping/>
   </p:clrMapOvr>
+  <mc:AlternateContent xmlns:mc="http://schemas.openxmlformats.org/markup-compatibility/2006">
+    <mc:Choice xmlns:p14="http://schemas.microsoft.com/office/powerpoint/2010/main" Requires="p14">
+      <p:transition spd="slow" p14:dur="800">
+        <p:circle/>
+      </p:transition>
+    </mc:Choice>
+    <mc:Fallback>
+      <p:transition spd="slow">
+        <p:circle/>
+      </p:transition>
+    </mc:Fallback>
+  </mc:AlternateContent>
 </p:sld>
 </file>
 
@@ -6322,6 +6615,18 @@
   <p:clrMapOvr>
     <a:masterClrMapping/>
   </p:clrMapOvr>
+  <mc:AlternateContent xmlns:mc="http://schemas.openxmlformats.org/markup-compatibility/2006">
+    <mc:Choice xmlns:p14="http://schemas.microsoft.com/office/powerpoint/2010/main" Requires="p14">
+      <p:transition spd="slow" p14:dur="800">
+        <p:circle/>
+      </p:transition>
+    </mc:Choice>
+    <mc:Fallback>
+      <p:transition spd="slow">
+        <p:circle/>
+      </p:transition>
+    </mc:Fallback>
+  </mc:AlternateContent>
 </p:sld>
 </file>
 
@@ -6397,7 +6702,7 @@
         <p:spPr bwMode="auto">
           <a:xfrm>
             <a:off x="1045590" y="1223179"/>
-            <a:ext cx="7254165" cy="1615827"/>
+            <a:ext cx="7117205" cy="1615827"/>
           </a:xfrm>
           <a:prstGeom prst="rect">
             <a:avLst/>
@@ -6462,7 +6767,7 @@
               <a:tabLst/>
             </a:pPr>
             <a:r>
-              <a:rPr kumimoji="0" lang="en-US" altLang="en-US" sz="1800" b="1" i="0" u="none" strike="noStrike" cap="none" normalizeH="0" baseline="0">
+              <a:rPr kumimoji="0" lang="en-US" altLang="en-US" sz="1800" i="0" u="none" strike="noStrike" cap="none" normalizeH="0" baseline="0">
                 <a:ln>
                   <a:noFill/>
                 </a:ln>
@@ -6471,94 +6776,10 @@
                 </a:solidFill>
                 <a:effectLst/>
                 <a:latin typeface="Arial" panose="020B0604020202020204" pitchFamily="34" charset="0"/>
+                <a:cs typeface="Arial" panose="020B0604020202020204" pitchFamily="34" charset="0"/>
               </a:rPr>
-              <a:t>Used </a:t>
-            </a:r>
-            <a:r>
-              <a:rPr kumimoji="0" lang="en-US" altLang="en-US" sz="1800" b="1" i="0" u="none" strike="noStrike" cap="none" normalizeH="0" baseline="0">
-                <a:ln>
-                  <a:noFill/>
-                </a:ln>
-                <a:solidFill>
-                  <a:schemeClr val="tx1"/>
-                </a:solidFill>
-                <a:effectLst/>
-                <a:latin typeface="Arial Unicode MS"/>
-              </a:rPr>
-              <a:t>groupby</a:t>
-            </a:r>
-            <a:r>
-              <a:rPr kumimoji="0" lang="en-US" altLang="en-US" sz="1800" b="1" i="0" u="none" strike="noStrike" cap="none" normalizeH="0" baseline="0">
-                <a:ln>
-                  <a:noFill/>
-                </a:ln>
-                <a:solidFill>
-                  <a:schemeClr val="tx1"/>
-                </a:solidFill>
-                <a:effectLst/>
-              </a:rPr>
-              <a:t> + </a:t>
-            </a:r>
-            <a:r>
-              <a:rPr kumimoji="0" lang="en-US" altLang="en-US" sz="1800" b="1" i="0" u="none" strike="noStrike" cap="none" normalizeH="0" baseline="0">
-                <a:ln>
-                  <a:noFill/>
-                </a:ln>
-                <a:solidFill>
-                  <a:schemeClr val="tx1"/>
-                </a:solidFill>
-                <a:effectLst/>
-                <a:latin typeface="Arial Unicode MS"/>
-              </a:rPr>
-              <a:t>rolling()</a:t>
-            </a:r>
-            <a:r>
-              <a:rPr kumimoji="0" lang="en-US" altLang="en-US" sz="1800" b="1" i="0" u="none" strike="noStrike" cap="none" normalizeH="0" baseline="0">
-                <a:ln>
-                  <a:noFill/>
-                </a:ln>
-                <a:solidFill>
-                  <a:schemeClr val="tx1"/>
-                </a:solidFill>
-                <a:effectLst/>
-              </a:rPr>
-              <a:t> + time-based windowing (</a:t>
-            </a:r>
-            <a:r>
-              <a:rPr kumimoji="0" lang="en-US" altLang="en-US" sz="1800" b="1" i="0" u="none" strike="noStrike" cap="none" normalizeH="0" baseline="0">
-                <a:ln>
-                  <a:noFill/>
-                </a:ln>
-                <a:solidFill>
-                  <a:schemeClr val="tx1"/>
-                </a:solidFill>
-                <a:effectLst/>
-                <a:latin typeface="Arial Unicode MS"/>
-              </a:rPr>
-              <a:t>'7D'</a:t>
-            </a:r>
-            <a:r>
-              <a:rPr kumimoji="0" lang="en-US" altLang="en-US" sz="1800" b="1" i="0" u="none" strike="noStrike" cap="none" normalizeH="0" baseline="0">
-                <a:ln>
-                  <a:noFill/>
-                </a:ln>
-                <a:solidFill>
-                  <a:schemeClr val="tx1"/>
-                </a:solidFill>
-                <a:effectLst/>
-              </a:rPr>
-              <a:t>)</a:t>
-            </a:r>
-            <a:endParaRPr kumimoji="0" lang="en-US" altLang="en-US" sz="1800" b="0" i="0" u="none" strike="noStrike" cap="none" normalizeH="0" baseline="0">
-              <a:ln>
-                <a:noFill/>
-              </a:ln>
-              <a:solidFill>
-                <a:schemeClr val="tx1"/>
-              </a:solidFill>
-              <a:effectLst/>
-              <a:latin typeface="Arial" panose="020B0604020202020204" pitchFamily="34" charset="0"/>
-            </a:endParaRPr>
+              <a:t>Used groupby + rolling() + time-based windowing ('7D')</a:t>
+            </a:r>
           </a:p>
           <a:p>
             <a:pPr marL="0" marR="0" lvl="0" indent="0" defTabSz="914400" rtl="0" eaLnBrk="0" fontAlgn="base" latinLnBrk="0" hangingPunct="0">
@@ -6578,7 +6799,7 @@
               <a:tabLst/>
             </a:pPr>
             <a:r>
-              <a:rPr kumimoji="0" lang="en-US" altLang="en-US" sz="1800" b="1" i="0" u="none" strike="noStrike" cap="none" normalizeH="0" baseline="0">
+              <a:rPr kumimoji="0" lang="en-US" altLang="en-US" sz="1800" i="0" u="none" strike="noStrike" cap="none" normalizeH="0" baseline="0">
                 <a:ln>
                   <a:noFill/>
                 </a:ln>
@@ -6587,44 +6808,10 @@
                 </a:solidFill>
                 <a:effectLst/>
                 <a:latin typeface="Arial" panose="020B0604020202020204" pitchFamily="34" charset="0"/>
+                <a:cs typeface="Arial" panose="020B0604020202020204" pitchFamily="34" charset="0"/>
               </a:rPr>
-              <a:t>Handled time series by setting </a:t>
-            </a:r>
-            <a:r>
-              <a:rPr kumimoji="0" lang="en-US" altLang="en-US" sz="1800" b="1" i="0" u="none" strike="noStrike" cap="none" normalizeH="0" baseline="0">
-                <a:ln>
-                  <a:noFill/>
-                </a:ln>
-                <a:solidFill>
-                  <a:schemeClr val="tx1"/>
-                </a:solidFill>
-                <a:effectLst/>
-                <a:latin typeface="Arial Unicode MS"/>
-              </a:rPr>
-              <a:t>TX_DATETIME</a:t>
-            </a:r>
-            <a:r>
-              <a:rPr kumimoji="0" lang="en-US" altLang="en-US" sz="1800" b="1" i="0" u="none" strike="noStrike" cap="none" normalizeH="0" baseline="0">
-                <a:ln>
-                  <a:noFill/>
-                </a:ln>
-                <a:solidFill>
-                  <a:schemeClr val="tx1"/>
-                </a:solidFill>
-                <a:effectLst/>
-              </a:rPr>
-              <a:t> as index temporarily</a:t>
-            </a:r>
-            <a:endParaRPr kumimoji="0" lang="en-US" altLang="en-US" sz="1800" b="0" i="0" u="none" strike="noStrike" cap="none" normalizeH="0" baseline="0">
-              <a:ln>
-                <a:noFill/>
-              </a:ln>
-              <a:solidFill>
-                <a:schemeClr val="tx1"/>
-              </a:solidFill>
-              <a:effectLst/>
-              <a:latin typeface="Arial" panose="020B0604020202020204" pitchFamily="34" charset="0"/>
-            </a:endParaRPr>
+              <a:t>Handled time series by setting TX_DATETIME as index temporarily</a:t>
+            </a:r>
           </a:p>
           <a:p>
             <a:pPr marL="0" marR="0" lvl="0" indent="0" defTabSz="914400" rtl="0" eaLnBrk="0" fontAlgn="base" latinLnBrk="0" hangingPunct="0">
@@ -6644,7 +6831,7 @@
               <a:tabLst/>
             </a:pPr>
             <a:r>
-              <a:rPr kumimoji="0" lang="en-US" altLang="en-US" sz="1800" b="1" i="0" u="none" strike="noStrike" cap="none" normalizeH="0" baseline="0">
+              <a:rPr kumimoji="0" lang="en-US" altLang="en-US" sz="1800" i="0" u="none" strike="noStrike" cap="none" normalizeH="0" baseline="0">
                 <a:ln>
                   <a:noFill/>
                 </a:ln>
@@ -6653,19 +6840,10 @@
                 </a:solidFill>
                 <a:effectLst/>
                 <a:latin typeface="Arial" panose="020B0604020202020204" pitchFamily="34" charset="0"/>
+                <a:cs typeface="Arial" panose="020B0604020202020204" pitchFamily="34" charset="0"/>
               </a:rPr>
               <a:t>Reset index after feature creation to keep structure intact</a:t>
             </a:r>
-            <a:endParaRPr kumimoji="0" lang="en-US" altLang="en-US" sz="1800" b="0" i="0" u="none" strike="noStrike" cap="none" normalizeH="0" baseline="0">
-              <a:ln>
-                <a:noFill/>
-              </a:ln>
-              <a:solidFill>
-                <a:schemeClr val="tx1"/>
-              </a:solidFill>
-              <a:effectLst/>
-              <a:latin typeface="Arial" panose="020B0604020202020204" pitchFamily="34" charset="0"/>
-            </a:endParaRPr>
           </a:p>
           <a:p>
             <a:pPr marL="0" marR="0" lvl="0" indent="0" algn="l" defTabSz="914400" rtl="0" eaLnBrk="0" fontAlgn="base" latinLnBrk="0" hangingPunct="0">
@@ -6707,6 +6885,18 @@
   <p:clrMapOvr>
     <a:masterClrMapping/>
   </p:clrMapOvr>
+  <mc:AlternateContent xmlns:mc="http://schemas.openxmlformats.org/markup-compatibility/2006">
+    <mc:Choice xmlns:p14="http://schemas.microsoft.com/office/powerpoint/2010/main" Requires="p14">
+      <p:transition spd="slow" p14:dur="800">
+        <p:circle/>
+      </p:transition>
+    </mc:Choice>
+    <mc:Fallback>
+      <p:transition spd="slow">
+        <p:circle/>
+      </p:transition>
+    </mc:Fallback>
+  </mc:AlternateContent>
 </p:sld>
 </file>
 
@@ -6856,6 +7046,18 @@
   <p:clrMapOvr>
     <a:masterClrMapping/>
   </p:clrMapOvr>
+  <mc:AlternateContent xmlns:mc="http://schemas.openxmlformats.org/markup-compatibility/2006">
+    <mc:Choice xmlns:p14="http://schemas.microsoft.com/office/powerpoint/2010/main" Requires="p14">
+      <p:transition spd="slow" p14:dur="800">
+        <p:circle/>
+      </p:transition>
+    </mc:Choice>
+    <mc:Fallback>
+      <p:transition spd="slow">
+        <p:circle/>
+      </p:transition>
+    </mc:Fallback>
+  </mc:AlternateContent>
 </p:sld>
 </file>
 

</xml_diff>